<commit_message>
upload lecture 5 by liangliang
</commit_message>
<xml_diff>
--- a/lecture/lecture5_llcao.pptx
+++ b/lecture/lecture5_llcao.pptx
@@ -14730,6 +14730,13 @@
   <p:clrMapOvr>
     <a:masterClrMapping/>
   </p:clrMapOvr>
+  <p:timing>
+    <p:tnLst>
+      <p:par>
+        <p:cTn id="1" dur="indefinite" restart="never" nodeType="tmRoot"/>
+      </p:par>
+    </p:tnLst>
+  </p:timing>
 </p:sld>
 </file>
 
@@ -15356,7 +15363,7 @@
       </p:sp>
       <p:pic>
         <p:nvPicPr>
-          <p:cNvPr id="1026" name="Picture 2" descr="https://cdn-images-1.medium.com/max/1000/1*AwJZkWLKabIicUPzSN6KCg.png"/>
+          <p:cNvPr id="3074" name="Picture 2" descr="mage result for mnist"/>
           <p:cNvPicPr>
             <a:picLocks noChangeAspect="1" noChangeArrowheads="1"/>
           </p:cNvPicPr>
@@ -15364,47 +15371,6 @@
         </p:nvPicPr>
         <p:blipFill>
           <a:blip r:embed="rId3">
-            <a:extLst>
-              <a:ext uri="{28A0092B-C50C-407E-A947-70E740481C1C}">
-                <a14:useLocalDpi xmlns:a14="http://schemas.microsoft.com/office/drawing/2010/main" val="0"/>
-              </a:ext>
-            </a:extLst>
-          </a:blip>
-          <a:srcRect/>
-          <a:stretch>
-            <a:fillRect/>
-          </a:stretch>
-        </p:blipFill>
-        <p:spPr bwMode="auto">
-          <a:xfrm>
-            <a:off x="392905" y="3325954"/>
-            <a:ext cx="8626067" cy="2354409"/>
-          </a:xfrm>
-          <a:prstGeom prst="rect">
-            <a:avLst/>
-          </a:prstGeom>
-          <a:noFill/>
-          <a:extLst>
-            <a:ext uri="{909E8E84-426E-40DD-AFC4-6F175D3DCCD1}">
-              <a14:hiddenFill xmlns:a14="http://schemas.microsoft.com/office/drawing/2010/main">
-                <a:solidFill>
-                  <a:srgbClr val="FFFFFF"/>
-                </a:solidFill>
-              </a14:hiddenFill>
-            </a:ext>
-          </a:extLst>
-        </p:spPr>
-      </p:pic>
-      <p:pic>
-        <p:nvPicPr>
-          <p:cNvPr id="3074" name="Picture 2" descr="mage result for mnist"/>
-          <p:cNvPicPr>
-            <a:picLocks noChangeAspect="1" noChangeArrowheads="1"/>
-          </p:cNvPicPr>
-          <p:nvPr/>
-        </p:nvPicPr>
-        <p:blipFill>
-          <a:blip r:embed="rId4">
             <a:extLst>
               <a:ext uri="{28A0092B-C50C-407E-A947-70E740481C1C}">
                 <a14:useLocalDpi xmlns:a14="http://schemas.microsoft.com/office/drawing/2010/main" val="0"/>
@@ -15434,6 +15400,30 @@
               </a14:hiddenFill>
             </a:ext>
           </a:extLst>
+        </p:spPr>
+      </p:pic>
+      <p:pic>
+        <p:nvPicPr>
+          <p:cNvPr id="2" name="Picture 1"/>
+          <p:cNvPicPr>
+            <a:picLocks noChangeAspect="1"/>
+          </p:cNvPicPr>
+          <p:nvPr/>
+        </p:nvPicPr>
+        <p:blipFill>
+          <a:blip r:embed="rId4"/>
+          <a:stretch>
+            <a:fillRect/>
+          </a:stretch>
+        </p:blipFill>
+        <p:spPr>
+          <a:xfrm>
+            <a:off x="377031" y="3179099"/>
+            <a:ext cx="8128000" cy="2667000"/>
+          </a:xfrm>
+          <a:prstGeom prst="rect">
+            <a:avLst/>
+          </a:prstGeom>
         </p:spPr>
       </p:pic>
     </p:spTree>
@@ -22773,6 +22763,13 @@
   <p:clrMapOvr>
     <a:masterClrMapping/>
   </p:clrMapOvr>
+  <p:timing>
+    <p:tnLst>
+      <p:par>
+        <p:cTn id="1" dur="indefinite" restart="never" nodeType="tmRoot"/>
+      </p:par>
+    </p:tnLst>
+  </p:timing>
 </p:sld>
 </file>
 
@@ -22957,6 +22954,13 @@
   <p:clrMapOvr>
     <a:masterClrMapping/>
   </p:clrMapOvr>
+  <p:timing>
+    <p:tnLst>
+      <p:par>
+        <p:cTn id="1" dur="indefinite" restart="never" nodeType="tmRoot"/>
+      </p:par>
+    </p:tnLst>
+  </p:timing>
 </p:sld>
 </file>
 
@@ -23955,6 +23959,13 @@
   <p:clrMapOvr>
     <a:masterClrMapping/>
   </p:clrMapOvr>
+  <p:timing>
+    <p:tnLst>
+      <p:par>
+        <p:cTn id="1" dur="indefinite" restart="never" nodeType="tmRoot"/>
+      </p:par>
+    </p:tnLst>
+  </p:timing>
 </p:sld>
 </file>
 
@@ -24619,6 +24630,13 @@
   <p:clrMapOvr>
     <a:masterClrMapping/>
   </p:clrMapOvr>
+  <p:timing>
+    <p:tnLst>
+      <p:par>
+        <p:cTn id="1" dur="indefinite" restart="never" nodeType="tmRoot"/>
+      </p:par>
+    </p:tnLst>
+  </p:timing>
 </p:sld>
 </file>
 
@@ -25300,6 +25318,13 @@
   <p:clrMapOvr>
     <a:masterClrMapping/>
   </p:clrMapOvr>
+  <p:timing>
+    <p:tnLst>
+      <p:par>
+        <p:cTn id="1" dur="indefinite" restart="never" nodeType="tmRoot"/>
+      </p:par>
+    </p:tnLst>
+  </p:timing>
 </p:sld>
 </file>
 
@@ -26689,6 +26714,13 @@
   <p:clrMapOvr>
     <a:masterClrMapping/>
   </p:clrMapOvr>
+  <p:timing>
+    <p:tnLst>
+      <p:par>
+        <p:cTn id="1" dur="indefinite" restart="never" nodeType="tmRoot"/>
+      </p:par>
+    </p:tnLst>
+  </p:timing>
 </p:sld>
 </file>
 
@@ -27608,6 +27640,13 @@
   <p:clrMapOvr>
     <a:masterClrMapping/>
   </p:clrMapOvr>
+  <p:timing>
+    <p:tnLst>
+      <p:par>
+        <p:cTn id="1" dur="indefinite" restart="never" nodeType="tmRoot"/>
+      </p:par>
+    </p:tnLst>
+  </p:timing>
 </p:sld>
 </file>
 
@@ -27979,6 +28018,13 @@
   <p:clrMapOvr>
     <a:masterClrMapping/>
   </p:clrMapOvr>
+  <p:timing>
+    <p:tnLst>
+      <p:par>
+        <p:cTn id="1" dur="indefinite" restart="never" nodeType="tmRoot"/>
+      </p:par>
+    </p:tnLst>
+  </p:timing>
 </p:sld>
 </file>
 
@@ -28849,22 +28895,33 @@
                 <a:latin typeface="Arial" panose="020B0604020202020204" pitchFamily="34" charset="0"/>
                 <a:cs typeface="Arial" panose="020B0604020202020204" pitchFamily="34" charset="0"/>
               </a:rPr>
-              <a:t>, padding='same', </a:t>
-            </a:r>
-            <a:r>
-              <a:rPr lang="en-US" sz="2000" i="0" dirty="0" err="1">
+              <a:t>, </a:t>
+            </a:r>
+            <a:r>
+              <a:rPr lang="en-US" sz="2000" i="0" dirty="0" smtClean="0">
                 <a:latin typeface="Arial" panose="020B0604020202020204" pitchFamily="34" charset="0"/>
                 <a:cs typeface="Arial" panose="020B0604020202020204" pitchFamily="34" charset="0"/>
               </a:rPr>
+              <a:t>padding=valid', </a:t>
+            </a:r>
+            <a:r>
+              <a:rPr lang="en-US" sz="2000" i="0" dirty="0" err="1" smtClean="0">
+                <a:latin typeface="Arial" panose="020B0604020202020204" pitchFamily="34" charset="0"/>
+                <a:cs typeface="Arial" panose="020B0604020202020204" pitchFamily="34" charset="0"/>
+              </a:rPr>
               <a:t>kernel_regularizer</a:t>
             </a:r>
             <a:r>
-              <a:rPr lang="en-US" sz="2000" i="0" dirty="0">
+              <a:rPr lang="en-US" sz="2000" i="0" dirty="0" smtClean="0">
                 <a:latin typeface="Arial" panose="020B0604020202020204" pitchFamily="34" charset="0"/>
                 <a:cs typeface="Arial" panose="020B0604020202020204" pitchFamily="34" charset="0"/>
               </a:rPr>
               <a:t>=l2(l2_reg))) </a:t>
             </a:r>
+            <a:endParaRPr lang="en-US" sz="2000" i="0" dirty="0">
+              <a:latin typeface="Arial" panose="020B0604020202020204" pitchFamily="34" charset="0"/>
+              <a:cs typeface="Arial" panose="020B0604020202020204" pitchFamily="34" charset="0"/>
+            </a:endParaRPr>
           </a:p>
           <a:p>
             <a:pPr marL="355600" indent="-355600">
@@ -28925,46 +28982,65 @@
               <a:t>relu</a:t>
             </a:r>
             <a:r>
+              <a:rPr lang="en-US" sz="2000" i="0" dirty="0" smtClean="0">
+                <a:latin typeface="Arial" panose="020B0604020202020204" pitchFamily="34" charset="0"/>
+                <a:cs typeface="Arial" panose="020B0604020202020204" pitchFamily="34" charset="0"/>
+              </a:rPr>
+              <a:t>'))</a:t>
+            </a:r>
+          </a:p>
+          <a:p>
+            <a:pPr marL="355600" indent="-355600">
+              <a:buNone/>
+            </a:pPr>
+            <a:r>
+              <a:rPr lang="en-US" sz="2000" i="0" dirty="0" err="1" smtClean="0">
+                <a:latin typeface="Arial" panose="020B0604020202020204" pitchFamily="34" charset="0"/>
+                <a:cs typeface="Arial" panose="020B0604020202020204" pitchFamily="34" charset="0"/>
+              </a:rPr>
+              <a:t>alexnet.add</a:t>
+            </a:r>
+            <a:r>
+              <a:rPr lang="en-US" sz="2000" i="0" dirty="0" smtClean="0">
+                <a:latin typeface="Arial" panose="020B0604020202020204" pitchFamily="34" charset="0"/>
+                <a:cs typeface="Arial" panose="020B0604020202020204" pitchFamily="34" charset="0"/>
+              </a:rPr>
+              <a:t>(MaxPooling2D(</a:t>
+            </a:r>
+            <a:r>
+              <a:rPr lang="mr-IN" sz="2000" i="0" dirty="0" err="1">
+                <a:latin typeface="Arial" panose="020B0604020202020204" pitchFamily="34" charset="0"/>
+                <a:cs typeface="Arial" panose="020B0604020202020204" pitchFamily="34" charset="0"/>
+              </a:rPr>
+              <a:t>strides</a:t>
+            </a:r>
+            <a:r>
+              <a:rPr lang="mr-IN" sz="2000" i="0" dirty="0" smtClean="0">
+                <a:latin typeface="Arial" panose="020B0604020202020204" pitchFamily="34" charset="0"/>
+                <a:cs typeface="Arial" panose="020B0604020202020204" pitchFamily="34" charset="0"/>
+              </a:rPr>
+              <a:t>=(4</a:t>
+            </a:r>
+            <a:r>
+              <a:rPr lang="mr-IN" sz="2000" i="0" dirty="0">
+                <a:latin typeface="Arial" panose="020B0604020202020204" pitchFamily="34" charset="0"/>
+                <a:cs typeface="Arial" panose="020B0604020202020204" pitchFamily="34" charset="0"/>
+              </a:rPr>
+              <a:t>, 4</a:t>
+            </a:r>
+            <a:r>
+              <a:rPr lang="mr-IN" sz="2000" i="0" dirty="0">
+                <a:latin typeface="Arial" panose="020B0604020202020204" pitchFamily="34" charset="0"/>
+                <a:cs typeface="Arial" panose="020B0604020202020204" pitchFamily="34" charset="0"/>
+              </a:rPr>
+              <a:t>)</a:t>
+            </a:r>
+            <a:r>
               <a:rPr lang="en-US" sz="2000" i="0" dirty="0">
                 <a:latin typeface="Arial" panose="020B0604020202020204" pitchFamily="34" charset="0"/>
                 <a:cs typeface="Arial" panose="020B0604020202020204" pitchFamily="34" charset="0"/>
               </a:rPr>
-              <a:t>')) </a:t>
-            </a:r>
-            <a:r>
-              <a:rPr lang="en-US" sz="2000" i="0" dirty="0" err="1">
-                <a:latin typeface="Arial" panose="020B0604020202020204" pitchFamily="34" charset="0"/>
-                <a:cs typeface="Arial" panose="020B0604020202020204" pitchFamily="34" charset="0"/>
-              </a:rPr>
-              <a:t>alexnet.add</a:t>
-            </a:r>
-            <a:r>
-              <a:rPr lang="en-US" sz="2000" i="0" dirty="0">
-                <a:latin typeface="Arial" panose="020B0604020202020204" pitchFamily="34" charset="0"/>
-                <a:cs typeface="Arial" panose="020B0604020202020204" pitchFamily="34" charset="0"/>
-              </a:rPr>
-              <a:t>(MaxPooling2D(</a:t>
-            </a:r>
-            <a:r>
-              <a:rPr lang="en-US" sz="2000" i="0" dirty="0" err="1">
-                <a:latin typeface="Arial" panose="020B0604020202020204" pitchFamily="34" charset="0"/>
-                <a:cs typeface="Arial" panose="020B0604020202020204" pitchFamily="34" charset="0"/>
-              </a:rPr>
-              <a:t>pool_size</a:t>
-            </a:r>
-            <a:r>
-              <a:rPr lang="en-US" sz="2000" i="0" dirty="0">
-                <a:latin typeface="Arial" panose="020B0604020202020204" pitchFamily="34" charset="0"/>
-                <a:cs typeface="Arial" panose="020B0604020202020204" pitchFamily="34" charset="0"/>
-              </a:rPr>
-              <a:t>=(2, 2</a:t>
-            </a:r>
-            <a:r>
-              <a:rPr lang="en-US" sz="2000" i="0" dirty="0" smtClean="0">
-                <a:latin typeface="Arial" panose="020B0604020202020204" pitchFamily="34" charset="0"/>
-                <a:cs typeface="Arial" panose="020B0604020202020204" pitchFamily="34" charset="0"/>
-              </a:rPr>
-              <a:t>)))</a:t>
+              <a:t>))</a:t>
             </a:r>
           </a:p>
           <a:p>
@@ -29349,7 +29425,31 @@
               <a:rPr lang="en-US" sz="2000" i="0" dirty="0" smtClean="0">
                 <a:cs typeface="Arial" panose="020B0604020202020204" pitchFamily="34" charset="0"/>
               </a:rPr>
-              <a:t>224 /4 = 55</a:t>
+              <a:t>(224-11) </a:t>
+            </a:r>
+            <a:r>
+              <a:rPr lang="en-US" sz="2000" i="0" dirty="0" smtClean="0">
+                <a:cs typeface="Arial" panose="020B0604020202020204" pitchFamily="34" charset="0"/>
+              </a:rPr>
+              <a:t>/</a:t>
+            </a:r>
+            <a:r>
+              <a:rPr lang="en-US" sz="2000" i="0" dirty="0" smtClean="0">
+                <a:cs typeface="Arial" panose="020B0604020202020204" pitchFamily="34" charset="0"/>
+              </a:rPr>
+              <a:t>4+1 </a:t>
+            </a:r>
+            <a:r>
+              <a:rPr lang="en-US" sz="2000" i="0" dirty="0" smtClean="0">
+                <a:cs typeface="Arial" panose="020B0604020202020204" pitchFamily="34" charset="0"/>
+              </a:rPr>
+              <a:t>= </a:t>
+            </a:r>
+            <a:r>
+              <a:rPr lang="en-US" sz="2000" i="0" dirty="0" smtClean="0">
+                <a:cs typeface="Arial" panose="020B0604020202020204" pitchFamily="34" charset="0"/>
+              </a:rPr>
+              <a:t>55</a:t>
             </a:r>
           </a:p>
           <a:p>
@@ -29361,7 +29461,37 @@
               <a:rPr lang="en-US" sz="2000" i="0" dirty="0" smtClean="0">
                 <a:cs typeface="Arial" panose="020B0604020202020204" pitchFamily="34" charset="0"/>
               </a:rPr>
-              <a:t>Output size (55 x 55 x 96)</a:t>
+              <a:t>Output </a:t>
+            </a:r>
+            <a:r>
+              <a:rPr lang="en-US" sz="2000" i="0" dirty="0" smtClean="0">
+                <a:cs typeface="Arial" panose="020B0604020202020204" pitchFamily="34" charset="0"/>
+              </a:rPr>
+              <a:t>size (</a:t>
+            </a:r>
+            <a:r>
+              <a:rPr lang="en-US" sz="2000" i="0" dirty="0" smtClean="0">
+                <a:cs typeface="Arial" panose="020B0604020202020204" pitchFamily="34" charset="0"/>
+              </a:rPr>
+              <a:t>56 </a:t>
+            </a:r>
+            <a:r>
+              <a:rPr lang="en-US" sz="2000" i="0" dirty="0" smtClean="0">
+                <a:cs typeface="Arial" panose="020B0604020202020204" pitchFamily="34" charset="0"/>
+              </a:rPr>
+              <a:t>x </a:t>
+            </a:r>
+            <a:r>
+              <a:rPr lang="en-US" sz="2000" i="0" dirty="0" smtClean="0">
+                <a:cs typeface="Arial" panose="020B0604020202020204" pitchFamily="34" charset="0"/>
+              </a:rPr>
+              <a:t>56 </a:t>
+            </a:r>
+            <a:r>
+              <a:rPr lang="en-US" sz="2000" i="0" dirty="0" smtClean="0">
+                <a:cs typeface="Arial" panose="020B0604020202020204" pitchFamily="34" charset="0"/>
+              </a:rPr>
+              <a:t>x 96)</a:t>
             </a:r>
           </a:p>
           <a:p>
@@ -29424,7 +29554,13 @@
               <a:rPr lang="en-US" sz="2000" i="0" dirty="0" smtClean="0">
                 <a:cs typeface="Arial" panose="020B0604020202020204" pitchFamily="34" charset="0"/>
               </a:rPr>
-              <a:t>55/2 = 27</a:t>
+              <a:t>55/2 </a:t>
+            </a:r>
+            <a:r>
+              <a:rPr lang="en-US" sz="2000" i="0" dirty="0" smtClean="0">
+                <a:cs typeface="Arial" panose="020B0604020202020204" pitchFamily="34" charset="0"/>
+              </a:rPr>
+              <a:t>= 27</a:t>
             </a:r>
           </a:p>
           <a:p>

</xml_diff>